<commit_message>
fix some error about the plot
</commit_message>
<xml_diff>
--- a/california_housing_predict.pptx
+++ b/california_housing_predict.pptx
@@ -6421,14 +6421,13 @@
         </p:nvPicPr>
         <p:blipFill>
           <a:blip r:embed="rId2"/>
-          <a:stretch>
-            <a:fillRect/>
-          </a:stretch>
+          <a:srcRect/>
+          <a:stretch/>
         </p:blipFill>
         <p:spPr>
           <a:xfrm>
-            <a:off x="6765333" y="1218253"/>
-            <a:ext cx="5821161" cy="3880774"/>
+            <a:off x="7201920" y="1218253"/>
+            <a:ext cx="4947986" cy="3880774"/>
           </a:xfrm>
           <a:prstGeom prst="rect">
             <a:avLst/>
@@ -6655,7 +6654,7 @@
             </a:r>
             <a:r>
               <a:rPr kumimoji="1" lang="zh-TW" altLang="en-US" dirty="0"/>
-              <a:t>越靠近右邊（海邊）的房價越高</a:t>
+              <a:t>越靠近左邊（海邊）的房價越高</a:t>
             </a:r>
             <a:endParaRPr kumimoji="1" lang="en-US" altLang="zh-TW" dirty="0"/>
           </a:p>
@@ -6771,14 +6770,13 @@
         </p:nvPicPr>
         <p:blipFill>
           <a:blip r:embed="rId3"/>
-          <a:stretch>
-            <a:fillRect/>
-          </a:stretch>
+          <a:srcRect/>
+          <a:stretch/>
         </p:blipFill>
         <p:spPr>
           <a:xfrm>
-            <a:off x="6444343" y="136431"/>
-            <a:ext cx="5937071" cy="4155949"/>
+            <a:off x="6585702" y="136431"/>
+            <a:ext cx="5654352" cy="4155949"/>
           </a:xfrm>
           <a:prstGeom prst="rect">
             <a:avLst/>

</xml_diff>